<commit_message>
Latest set of changes.
</commit_message>
<xml_diff>
--- a/docs/Support Slides.pptx
+++ b/docs/Support Slides.pptx
@@ -5906,25 +5906,6 @@
           </a:p>
         </p:txBody>
       </p:sp>
-      <p:sp>
-        <p:nvSpPr>
-          <p:cNvPr id="3" name="Subtitle 2"/>
-          <p:cNvSpPr>
-            <a:spLocks noGrp="1"/>
-          </p:cNvSpPr>
-          <p:nvPr>
-            <p:ph type="subTitle" idx="1"/>
-          </p:nvPr>
-        </p:nvSpPr>
-        <p:spPr/>
-        <p:txBody>
-          <a:bodyPr/>
-          <a:lstStyle/>
-          <a:p>
-            <a:endParaRPr lang="en-US"/>
-          </a:p>
-        </p:txBody>
-      </p:sp>
     </p:spTree>
     <p:extLst>
       <p:ext uri="{BB962C8B-B14F-4D97-AF65-F5344CB8AC3E}">
@@ -6602,7 +6583,19 @@
           <a:p>
             <a:r>
               <a:rPr lang="en-US" dirty="0" smtClean="0"/>
-              <a:t>Note: Variable will be explained in a moment…</a:t>
+              <a:t>Note: </a:t>
+            </a:r>
+            <a:r>
+              <a:rPr lang="en-US" dirty="0" smtClean="0">
+                <a:solidFill>
+                  <a:srgbClr val="00B0F0"/>
+                </a:solidFill>
+              </a:rPr>
+              <a:t>Variable</a:t>
+            </a:r>
+            <a:r>
+              <a:rPr lang="en-US" dirty="0" smtClean="0"/>
+              <a:t> will be explained in a moment…</a:t>
             </a:r>
           </a:p>
           <a:p>
@@ -6653,10 +6646,26 @@
             </a:pPr>
             <a:r>
               <a:rPr lang="en-US" sz="1600" dirty="0"/>
-              <a:t>	Attribute at = </a:t>
-            </a:r>
-            <a:r>
-              <a:rPr lang="en-US" sz="1600" dirty="0" err="1"/>
+              <a:t>	Attribute </a:t>
+            </a:r>
+            <a:r>
+              <a:rPr lang="en-US" sz="1600" b="1" dirty="0">
+                <a:solidFill>
+                  <a:srgbClr val="00B050"/>
+                </a:solidFill>
+              </a:rPr>
+              <a:t>at</a:t>
+            </a:r>
+            <a:r>
+              <a:rPr lang="en-US" sz="1600" dirty="0"/>
+              <a:t> = </a:t>
+            </a:r>
+            <a:r>
+              <a:rPr lang="en-US" sz="1600" b="1" dirty="0" err="1">
+                <a:solidFill>
+                  <a:srgbClr val="00B0F0"/>
+                </a:solidFill>
+              </a:rPr>
               <a:t>v.attributeValue</a:t>
             </a:r>
             <a:r>
@@ -6846,6 +6855,9 @@
             </a:r>
           </a:p>
           <a:p>
+            <a:endParaRPr lang="en-US" dirty="0" smtClean="0"/>
+          </a:p>
+          <a:p>
             <a:r>
               <a:rPr lang="en-US" dirty="0" smtClean="0"/>
               <a:t>Objectivity/DB is written primarily in C++. </a:t>
@@ -6859,10 +6871,17 @@
             </a:r>
           </a:p>
           <a:p>
+            <a:pPr lvl="1"/>
+            <a:endParaRPr lang="en-US" dirty="0" smtClean="0"/>
+          </a:p>
+          <a:p>
             <a:r>
               <a:rPr lang="en-US" dirty="0" smtClean="0"/>
               <a:t>But we need to support other programming languages.</a:t>
             </a:r>
+          </a:p>
+          <a:p>
+            <a:endParaRPr lang="en-US" dirty="0" smtClean="0"/>
           </a:p>
           <a:p>
             <a:r>
@@ -7794,7 +7813,23 @@
           <a:p>
             <a:r>
               <a:rPr lang="en-US" dirty="0" smtClean="0"/>
-              <a:t>One of those situations is in preventing deadlocks.</a:t>
+              <a:t>One of those situations is in </a:t>
+            </a:r>
+            <a:r>
+              <a:rPr lang="en-US" u="sng" dirty="0" smtClean="0"/>
+              <a:t>preventing</a:t>
+            </a:r>
+            <a:r>
+              <a:rPr lang="en-US" dirty="0" smtClean="0"/>
+              <a:t> </a:t>
+            </a:r>
+            <a:r>
+              <a:rPr lang="en-US" u="sng" dirty="0" smtClean="0"/>
+              <a:t>deadlocks</a:t>
+            </a:r>
+            <a:r>
+              <a:rPr lang="en-US" dirty="0" smtClean="0"/>
+              <a:t>.</a:t>
             </a:r>
           </a:p>
           <a:p>
@@ -8043,7 +8078,11 @@
               <a:buNone/>
             </a:pPr>
             <a:r>
-              <a:rPr lang="en-US" sz="1400" b="1" dirty="0" smtClean="0"/>
+              <a:rPr lang="en-US" sz="1400" b="1" dirty="0" smtClean="0">
+                <a:solidFill>
+                  <a:srgbClr val="FF0000"/>
+                </a:solidFill>
+              </a:rPr>
               <a:t>// Do the work here…</a:t>
             </a:r>
           </a:p>

</xml_diff>